<commit_message>
SCR 10 neu eLizenzen eingepflegt
</commit_message>
<xml_diff>
--- a/training-cards/music moves/Scrum (SCR)/ger/apprentice/ger_SCR_10_Hubschrauberperspektive_MM_A.pptx
+++ b/training-cards/music moves/Scrum (SCR)/ger/apprentice/ger_SCR_10_Hubschrauberperspektive_MM_A.pptx
@@ -512,14 +512,20 @@
       </p:pic>
       <p:sp>
         <p:nvSpPr>
-          <p:cNvPr id="5" name="Shape 7"/>
+          <p:cNvPr id="4" name="Shape 7">
+            <a:extLst>
+              <a:ext uri="{FF2B5EF4-FFF2-40B4-BE49-F238E27FC236}">
+                <a16:creationId xmlns:a16="http://schemas.microsoft.com/office/drawing/2014/main" id="{A6107C09-E665-91D9-BF95-CDDD367C20BA}"/>
+              </a:ext>
+            </a:extLst>
+          </p:cNvPr>
           <p:cNvSpPr/>
           <p:nvPr userDrawn="1"/>
         </p:nvSpPr>
         <p:spPr>
           <a:xfrm>
-            <a:off x="1683417" y="4952581"/>
-            <a:ext cx="4196016" cy="276995"/>
+            <a:off x="971550" y="4689585"/>
+            <a:ext cx="4691860" cy="461661"/>
           </a:xfrm>
           <a:prstGeom prst="rect">
             <a:avLst/>
@@ -529,12 +535,12 @@
           </a:ln>
           <a:extLst>
             <a:ext uri="{C572A759-6A51-4108-AA02-DFA0A04FC94B}">
-              <ma14:wrappingTextBoxFlag xmlns:ma14="http://schemas.microsoft.com/office/mac/drawingml/2011/main" xmlns="" val="1"/>
+              <ma14:wrappingTextBoxFlag xmlns="" xmlns:ma14="http://schemas.microsoft.com/office/mac/drawingml/2011/main" val="1"/>
             </a:ext>
           </a:extLst>
         </p:spPr>
         <p:txBody>
-          <a:bodyPr wrap="none" lIns="45718" tIns="45718" rIns="45718" bIns="45718">
+          <a:bodyPr wrap="square" lIns="45718" tIns="45718" rIns="45718" bIns="45718">
             <a:spAutoFit/>
           </a:bodyPr>
           <a:lstStyle/>
@@ -543,49 +549,266 @@
               <a:defRPr sz="1800"/>
             </a:pPr>
             <a:r>
-              <a:rPr sz="600" dirty="0">
-                <a:latin typeface="Avenir Light"/>
+              <a:rPr lang="de-DE" sz="800" b="0" i="0" u="none" strike="noStrike" dirty="0" err="1">
+                <a:solidFill>
+                  <a:schemeClr val="tx1">
+                    <a:lumMod val="65000"/>
+                    <a:lumOff val="35000"/>
+                  </a:schemeClr>
+                </a:solidFill>
+                <a:effectLst/>
+                <a:latin typeface="Avenir Book" panose="02000503020000020003" pitchFamily="2" charset="0"/>
+              </a:rPr>
+              <a:t>music</a:t>
+            </a:r>
+            <a:r>
+              <a:rPr lang="de-DE" sz="800" b="0" i="0" u="none" strike="noStrike" dirty="0">
+                <a:solidFill>
+                  <a:schemeClr val="tx1">
+                    <a:lumMod val="65000"/>
+                    <a:lumOff val="35000"/>
+                  </a:schemeClr>
+                </a:solidFill>
+                <a:effectLst/>
+                <a:latin typeface="Avenir Book" panose="02000503020000020003" pitchFamily="2" charset="0"/>
+              </a:rPr>
+              <a:t> </a:t>
+            </a:r>
+            <a:r>
+              <a:rPr lang="de-DE" sz="800" b="0" i="0" u="none" strike="noStrike" dirty="0" err="1">
+                <a:solidFill>
+                  <a:schemeClr val="tx1">
+                    <a:lumMod val="65000"/>
+                    <a:lumOff val="35000"/>
+                  </a:schemeClr>
+                </a:solidFill>
+                <a:effectLst/>
+                <a:latin typeface="Avenir Book" panose="02000503020000020003" pitchFamily="2" charset="0"/>
+              </a:rPr>
+              <a:t>moves</a:t>
+            </a:r>
+            <a:r>
+              <a:rPr lang="de-DE" sz="800" b="0" i="0" u="none" strike="noStrike" dirty="0">
+                <a:solidFill>
+                  <a:schemeClr val="tx1">
+                    <a:lumMod val="65000"/>
+                    <a:lumOff val="35000"/>
+                  </a:schemeClr>
+                </a:solidFill>
+                <a:effectLst/>
+                <a:latin typeface="Avenir Book" panose="02000503020000020003" pitchFamily="2" charset="0"/>
+              </a:rPr>
+              <a:t>-Trainingskarten von Regina Brandhuber sind lizenziert unter einer Creative Commons </a:t>
+            </a:r>
+          </a:p>
+          <a:p>
+            <a:pPr lvl="0" algn="ctr">
+              <a:defRPr sz="1800"/>
+            </a:pPr>
+            <a:r>
+              <a:rPr lang="de-DE" sz="800" b="0" i="0" u="none" strike="noStrike" dirty="0">
+                <a:solidFill>
+                  <a:schemeClr val="tx1">
+                    <a:lumMod val="65000"/>
+                    <a:lumOff val="35000"/>
+                  </a:schemeClr>
+                </a:solidFill>
+                <a:effectLst/>
+                <a:latin typeface="Avenir Book" panose="02000503020000020003" pitchFamily="2" charset="0"/>
+              </a:rPr>
+              <a:t>Namensnennung-Nicht kommerziell 4.0 International Lizenz.</a:t>
+            </a:r>
+          </a:p>
+          <a:p>
+            <a:pPr lvl="0" algn="ctr">
+              <a:defRPr sz="1800"/>
+            </a:pPr>
+            <a:r>
+              <a:rPr lang="de-DE" sz="800" dirty="0">
+                <a:solidFill>
+                  <a:schemeClr val="tx1">
+                    <a:lumMod val="65000"/>
+                    <a:lumOff val="35000"/>
+                  </a:schemeClr>
+                </a:solidFill>
+                <a:latin typeface="Avenir Book" panose="02000503020000020003" pitchFamily="2" charset="0"/>
                 <a:ea typeface="Calibri"/>
                 <a:cs typeface="Avenir Light"/>
                 <a:sym typeface="Calibri"/>
               </a:rPr>
-              <a:t>This work is licensed under the Creative Commons Attribution-NonCommercial-NoDerivatives 4.0 International License. </a:t>
-            </a:r>
-          </a:p>
-          <a:p>
-            <a:pPr lvl="0" algn="ctr">
-              <a:defRPr sz="1800"/>
-            </a:pPr>
-            <a:r>
-              <a:rPr sz="600" dirty="0">
-                <a:latin typeface="Avenir Light"/>
+              <a:t>Nachzulesen unter:</a:t>
+            </a:r>
+            <a:r>
+              <a:rPr sz="800" dirty="0">
+                <a:solidFill>
+                  <a:schemeClr val="tx1">
+                    <a:lumMod val="65000"/>
+                    <a:lumOff val="35000"/>
+                  </a:schemeClr>
+                </a:solidFill>
+                <a:latin typeface="Avenir Book" panose="02000503020000020003" pitchFamily="2" charset="0"/>
                 <a:ea typeface="Calibri"/>
                 <a:cs typeface="Avenir Light"/>
                 <a:sym typeface="Calibri"/>
               </a:rPr>
-              <a:t>To view a copy of this license, visit http://creativecommons.org/licenses/by-nc-nd/4.0/.</a:t>
-            </a:r>
+              <a:t> </a:t>
+            </a:r>
+            <a:r>
+              <a:rPr lang="de-DE" sz="800" dirty="0">
+                <a:solidFill>
+                  <a:schemeClr val="tx1">
+                    <a:lumMod val="65000"/>
+                    <a:lumOff val="35000"/>
+                  </a:schemeClr>
+                </a:solidFill>
+                <a:latin typeface="Avenir Book" panose="02000503020000020003" pitchFamily="2" charset="0"/>
+                <a:ea typeface="Calibri"/>
+                <a:cs typeface="Avenir Light"/>
+                <a:sym typeface="Calibri"/>
+              </a:rPr>
+              <a:t>https://</a:t>
+            </a:r>
+            <a:r>
+              <a:rPr lang="de-DE" sz="800" dirty="0" err="1">
+                <a:solidFill>
+                  <a:schemeClr val="tx1">
+                    <a:lumMod val="65000"/>
+                    <a:lumOff val="35000"/>
+                  </a:schemeClr>
+                </a:solidFill>
+                <a:latin typeface="Avenir Book" panose="02000503020000020003" pitchFamily="2" charset="0"/>
+                <a:ea typeface="Calibri"/>
+                <a:cs typeface="Avenir Light"/>
+                <a:sym typeface="Calibri"/>
+              </a:rPr>
+              <a:t>creativecommons.org</a:t>
+            </a:r>
+            <a:r>
+              <a:rPr lang="de-DE" sz="800" dirty="0">
+                <a:solidFill>
+                  <a:schemeClr val="tx1">
+                    <a:lumMod val="65000"/>
+                    <a:lumOff val="35000"/>
+                  </a:schemeClr>
+                </a:solidFill>
+                <a:latin typeface="Avenir Book" panose="02000503020000020003" pitchFamily="2" charset="0"/>
+                <a:ea typeface="Calibri"/>
+                <a:cs typeface="Avenir Light"/>
+                <a:sym typeface="Calibri"/>
+              </a:rPr>
+              <a:t>/</a:t>
+            </a:r>
+            <a:r>
+              <a:rPr lang="de-DE" sz="800" dirty="0" err="1">
+                <a:solidFill>
+                  <a:schemeClr val="tx1">
+                    <a:lumMod val="65000"/>
+                    <a:lumOff val="35000"/>
+                  </a:schemeClr>
+                </a:solidFill>
+                <a:latin typeface="Avenir Book" panose="02000503020000020003" pitchFamily="2" charset="0"/>
+                <a:ea typeface="Calibri"/>
+                <a:cs typeface="Avenir Light"/>
+                <a:sym typeface="Calibri"/>
+              </a:rPr>
+              <a:t>licenses</a:t>
+            </a:r>
+            <a:r>
+              <a:rPr lang="de-DE" sz="800" dirty="0">
+                <a:solidFill>
+                  <a:schemeClr val="tx1">
+                    <a:lumMod val="65000"/>
+                    <a:lumOff val="35000"/>
+                  </a:schemeClr>
+                </a:solidFill>
+                <a:latin typeface="Avenir Book" panose="02000503020000020003" pitchFamily="2" charset="0"/>
+                <a:ea typeface="Calibri"/>
+                <a:cs typeface="Avenir Light"/>
+                <a:sym typeface="Calibri"/>
+              </a:rPr>
+              <a:t>/</a:t>
+            </a:r>
+            <a:r>
+              <a:rPr lang="de-DE" sz="800" dirty="0" err="1">
+                <a:solidFill>
+                  <a:schemeClr val="tx1">
+                    <a:lumMod val="65000"/>
+                    <a:lumOff val="35000"/>
+                  </a:schemeClr>
+                </a:solidFill>
+                <a:latin typeface="Avenir Book" panose="02000503020000020003" pitchFamily="2" charset="0"/>
+                <a:ea typeface="Calibri"/>
+                <a:cs typeface="Avenir Light"/>
+                <a:sym typeface="Calibri"/>
+              </a:rPr>
+              <a:t>by-nc</a:t>
+            </a:r>
+            <a:r>
+              <a:rPr lang="de-DE" sz="800" dirty="0">
+                <a:solidFill>
+                  <a:schemeClr val="tx1">
+                    <a:lumMod val="65000"/>
+                    <a:lumOff val="35000"/>
+                  </a:schemeClr>
+                </a:solidFill>
+                <a:latin typeface="Avenir Book" panose="02000503020000020003" pitchFamily="2" charset="0"/>
+                <a:ea typeface="Calibri"/>
+                <a:cs typeface="Avenir Light"/>
+                <a:sym typeface="Calibri"/>
+              </a:rPr>
+              <a:t>/4.0/</a:t>
+            </a:r>
+            <a:r>
+              <a:rPr lang="de-DE" sz="800" dirty="0" err="1">
+                <a:solidFill>
+                  <a:schemeClr val="tx1">
+                    <a:lumMod val="65000"/>
+                    <a:lumOff val="35000"/>
+                  </a:schemeClr>
+                </a:solidFill>
+                <a:latin typeface="Avenir Book" panose="02000503020000020003" pitchFamily="2" charset="0"/>
+                <a:ea typeface="Calibri"/>
+                <a:cs typeface="Avenir Light"/>
+                <a:sym typeface="Calibri"/>
+              </a:rPr>
+              <a:t>deed.de</a:t>
+            </a:r>
+            <a:endParaRPr sz="800" dirty="0">
+              <a:solidFill>
+                <a:schemeClr val="tx1">
+                  <a:lumMod val="65000"/>
+                  <a:lumOff val="35000"/>
+                </a:schemeClr>
+              </a:solidFill>
+              <a:latin typeface="Avenir Book" panose="02000503020000020003" pitchFamily="2" charset="0"/>
+              <a:ea typeface="Calibri"/>
+              <a:cs typeface="Avenir Light"/>
+              <a:sym typeface="Calibri"/>
+            </a:endParaRPr>
           </a:p>
         </p:txBody>
       </p:sp>
       <p:pic>
         <p:nvPicPr>
-          <p:cNvPr id="6" name="pasted-image.tif"/>
+          <p:cNvPr id="8" name="pasted-image.tif">
+            <a:extLst>
+              <a:ext uri="{FF2B5EF4-FFF2-40B4-BE49-F238E27FC236}">
+                <a16:creationId xmlns:a16="http://schemas.microsoft.com/office/drawing/2014/main" id="{B636C351-67CB-872C-1512-B1D7605060A0}"/>
+              </a:ext>
+            </a:extLst>
+          </p:cNvPr>
           <p:cNvPicPr/>
           <p:nvPr userDrawn="1"/>
         </p:nvPicPr>
-        <p:blipFill>
-          <a:blip r:embed="rId4">
-            <a:extLst/>
-          </a:blip>
-          <a:stretch>
-            <a:fillRect/>
-          </a:stretch>
+        <p:blipFill rotWithShape="1">
+          <a:blip r:embed="rId4"/>
+          <a:srcRect r="24777" b="-3233"/>
+          <a:stretch/>
         </p:blipFill>
         <p:spPr>
           <a:xfrm>
-            <a:off x="6174185" y="4992838"/>
-            <a:ext cx="886619" cy="214128"/>
+            <a:off x="5724347" y="4733926"/>
+            <a:ext cx="1009828" cy="333374"/>
           </a:xfrm>
           <a:prstGeom prst="rect">
             <a:avLst/>
@@ -595,58 +818,6 @@
           </a:ln>
         </p:spPr>
       </p:pic>
-      <p:sp>
-        <p:nvSpPr>
-          <p:cNvPr id="7" name="Textfeld 6"/>
-          <p:cNvSpPr txBox="1"/>
-          <p:nvPr userDrawn="1"/>
-        </p:nvSpPr>
-        <p:spPr>
-          <a:xfrm>
-            <a:off x="239285" y="4936890"/>
-            <a:ext cx="1044856" cy="276999"/>
-          </a:xfrm>
-          <a:prstGeom prst="rect">
-            <a:avLst/>
-          </a:prstGeom>
-          <a:noFill/>
-        </p:spPr>
-        <p:txBody>
-          <a:bodyPr wrap="square" rtlCol="0">
-            <a:spAutoFit/>
-          </a:bodyPr>
-          <a:lstStyle/>
-          <a:p>
-            <a:r>
-              <a:rPr lang="de-DE" sz="600" dirty="0">
-                <a:solidFill>
-                  <a:srgbClr val="5D5E5F"/>
-                </a:solidFill>
-                <a:latin typeface="Avenir Light"/>
-                <a:cs typeface="Avenir Light"/>
-              </a:rPr>
-              <a:t>Letzte Änderung: </a:t>
-            </a:r>
-            <a:fld id="{7A8C7DAC-E536-564C-B5B3-90E8FAB50562}" type="datetime1">
-              <a:rPr lang="de-DE" sz="600" smtClean="0">
-                <a:solidFill>
-                  <a:srgbClr val="5D5E5F"/>
-                </a:solidFill>
-                <a:latin typeface="Avenir Light"/>
-                <a:cs typeface="Avenir Light"/>
-              </a:rPr>
-              <a:t>19.09.18</a:t>
-            </a:fld>
-            <a:endParaRPr lang="de-DE" sz="600" dirty="0">
-              <a:solidFill>
-                <a:srgbClr val="5D5E5F"/>
-              </a:solidFill>
-              <a:latin typeface="Avenir Light"/>
-              <a:cs typeface="Avenir Light"/>
-            </a:endParaRPr>
-          </a:p>
-        </p:txBody>
-      </p:sp>
     </p:spTree>
     <p:extLst>
       <p:ext uri="{BB962C8B-B14F-4D97-AF65-F5344CB8AC3E}">
@@ -716,7 +887,7 @@
           <a:p>
             <a:fld id="{FF5B2BAF-DF38-0A48-A798-0C06E514FD52}" type="datetimeFigureOut">
               <a:rPr lang="de-DE" smtClean="0"/>
-              <a:t>19.09.18</a:t>
+              <a:t>27.07.23</a:t>
             </a:fld>
             <a:endParaRPr lang="de-DE" dirty="0"/>
           </a:p>
@@ -936,7 +1107,7 @@
           <a:p>
             <a:fld id="{FF5B2BAF-DF38-0A48-A798-0C06E514FD52}" type="datetimeFigureOut">
               <a:rPr lang="de-DE" smtClean="0"/>
-              <a:t>19.09.18</a:t>
+              <a:t>27.07.23</a:t>
             </a:fld>
             <a:endParaRPr lang="de-DE" dirty="0"/>
           </a:p>

</xml_diff>

<commit_message>
SCR 20 Quelle eingearbeitet, Blocksatz
</commit_message>
<xml_diff>
--- a/training-cards/music moves/Scrum (SCR)/ger/apprentice/ger_SCR_10_Hubschrauberperspektive_MM_A.pptx
+++ b/training-cards/music moves/Scrum (SCR)/ger/apprentice/ger_SCR_10_Hubschrauberperspektive_MM_A.pptx
@@ -4,6 +4,9 @@
   <p:sldMasterIdLst>
     <p:sldMasterId id="2147483648" r:id="rId1"/>
   </p:sldMasterIdLst>
+  <p:notesMasterIdLst>
+    <p:notesMasterId r:id="rId4"/>
+  </p:notesMasterIdLst>
   <p:sldIdLst>
     <p:sldId id="258" r:id="rId2"/>
     <p:sldId id="256" r:id="rId3"/>
@@ -124,6 +127,440 @@
 </p:presentation>
 </file>
 
+<file path=ppt/notesMasters/notesMaster1.xml><?xml version="1.0" encoding="utf-8"?>
+<p:notesMaster xmlns:a="http://schemas.openxmlformats.org/drawingml/2006/main" xmlns:r="http://schemas.openxmlformats.org/officeDocument/2006/relationships" xmlns:p="http://schemas.openxmlformats.org/presentationml/2006/main">
+  <p:cSld>
+    <p:bg>
+      <p:bgRef idx="1001">
+        <a:schemeClr val="bg1"/>
+      </p:bgRef>
+    </p:bg>
+    <p:spTree>
+      <p:nvGrpSpPr>
+        <p:cNvPr id="1" name=""/>
+        <p:cNvGrpSpPr/>
+        <p:nvPr/>
+      </p:nvGrpSpPr>
+      <p:grpSpPr>
+        <a:xfrm>
+          <a:off x="0" y="0"/>
+          <a:ext cx="0" cy="0"/>
+          <a:chOff x="0" y="0"/>
+          <a:chExt cx="0" cy="0"/>
+        </a:xfrm>
+      </p:grpSpPr>
+      <p:sp>
+        <p:nvSpPr>
+          <p:cNvPr id="2" name="Kopfzeilenplatzhalter 1"/>
+          <p:cNvSpPr>
+            <a:spLocks noGrp="1"/>
+          </p:cNvSpPr>
+          <p:nvPr>
+            <p:ph type="hdr" sz="quarter"/>
+          </p:nvPr>
+        </p:nvSpPr>
+        <p:spPr>
+          <a:xfrm>
+            <a:off x="0" y="0"/>
+            <a:ext cx="2971800" cy="458788"/>
+          </a:xfrm>
+          <a:prstGeom prst="rect">
+            <a:avLst/>
+          </a:prstGeom>
+        </p:spPr>
+        <p:txBody>
+          <a:bodyPr vert="horz" lIns="91440" tIns="45720" rIns="91440" bIns="45720" rtlCol="0"/>
+          <a:lstStyle>
+            <a:lvl1pPr algn="l">
+              <a:defRPr sz="1200"/>
+            </a:lvl1pPr>
+          </a:lstStyle>
+          <a:p>
+            <a:endParaRPr lang="en-US"/>
+          </a:p>
+        </p:txBody>
+      </p:sp>
+      <p:sp>
+        <p:nvSpPr>
+          <p:cNvPr id="3" name="Datumsplatzhalter 2"/>
+          <p:cNvSpPr>
+            <a:spLocks noGrp="1"/>
+          </p:cNvSpPr>
+          <p:nvPr>
+            <p:ph type="dt" idx="1"/>
+          </p:nvPr>
+        </p:nvSpPr>
+        <p:spPr>
+          <a:xfrm>
+            <a:off x="3884613" y="0"/>
+            <a:ext cx="2971800" cy="458788"/>
+          </a:xfrm>
+          <a:prstGeom prst="rect">
+            <a:avLst/>
+          </a:prstGeom>
+        </p:spPr>
+        <p:txBody>
+          <a:bodyPr vert="horz" lIns="91440" tIns="45720" rIns="91440" bIns="45720" rtlCol="0"/>
+          <a:lstStyle>
+            <a:lvl1pPr algn="r">
+              <a:defRPr sz="1200"/>
+            </a:lvl1pPr>
+          </a:lstStyle>
+          <a:p>
+            <a:fld id="{65A7DEB4-B5AE-0041-BF85-C0060B36FE09}" type="datetimeFigureOut">
+              <a:rPr lang="en-US" smtClean="0"/>
+              <a:t>7/25/24</a:t>
+            </a:fld>
+            <a:endParaRPr lang="en-US"/>
+          </a:p>
+        </p:txBody>
+      </p:sp>
+      <p:sp>
+        <p:nvSpPr>
+          <p:cNvPr id="4" name="Folienbildplatzhalter 3"/>
+          <p:cNvSpPr>
+            <a:spLocks noGrp="1" noRot="1" noChangeAspect="1"/>
+          </p:cNvSpPr>
+          <p:nvPr>
+            <p:ph type="sldImg" idx="2"/>
+          </p:nvPr>
+        </p:nvSpPr>
+        <p:spPr>
+          <a:xfrm>
+            <a:off x="1239838" y="1143000"/>
+            <a:ext cx="4378325" cy="3086100"/>
+          </a:xfrm>
+          <a:prstGeom prst="rect">
+            <a:avLst/>
+          </a:prstGeom>
+          <a:noFill/>
+          <a:ln w="12700">
+            <a:solidFill>
+              <a:prstClr val="black"/>
+            </a:solidFill>
+          </a:ln>
+        </p:spPr>
+        <p:txBody>
+          <a:bodyPr vert="horz" lIns="91440" tIns="45720" rIns="91440" bIns="45720" rtlCol="0" anchor="ctr"/>
+          <a:lstStyle/>
+          <a:p>
+            <a:endParaRPr lang="en-US"/>
+          </a:p>
+        </p:txBody>
+      </p:sp>
+      <p:sp>
+        <p:nvSpPr>
+          <p:cNvPr id="5" name="Notizenplatzhalter 4"/>
+          <p:cNvSpPr>
+            <a:spLocks noGrp="1"/>
+          </p:cNvSpPr>
+          <p:nvPr>
+            <p:ph type="body" sz="quarter" idx="3"/>
+          </p:nvPr>
+        </p:nvSpPr>
+        <p:spPr>
+          <a:xfrm>
+            <a:off x="685800" y="4400550"/>
+            <a:ext cx="5486400" cy="3600450"/>
+          </a:xfrm>
+          <a:prstGeom prst="rect">
+            <a:avLst/>
+          </a:prstGeom>
+        </p:spPr>
+        <p:txBody>
+          <a:bodyPr vert="horz" lIns="91440" tIns="45720" rIns="91440" bIns="45720" rtlCol="0"/>
+          <a:lstStyle/>
+          <a:p>
+            <a:pPr lvl="0"/>
+            <a:r>
+              <a:rPr lang="de-DE"/>
+              <a:t>Mastertextformat bearbeiten</a:t>
+            </a:r>
+          </a:p>
+          <a:p>
+            <a:pPr lvl="1"/>
+            <a:r>
+              <a:rPr lang="de-DE"/>
+              <a:t>Zweite Ebene</a:t>
+            </a:r>
+          </a:p>
+          <a:p>
+            <a:pPr lvl="2"/>
+            <a:r>
+              <a:rPr lang="de-DE"/>
+              <a:t>Dritte Ebene</a:t>
+            </a:r>
+          </a:p>
+          <a:p>
+            <a:pPr lvl="3"/>
+            <a:r>
+              <a:rPr lang="de-DE"/>
+              <a:t>Vierte Ebene</a:t>
+            </a:r>
+          </a:p>
+          <a:p>
+            <a:pPr lvl="4"/>
+            <a:r>
+              <a:rPr lang="de-DE"/>
+              <a:t>Fünfte Ebene</a:t>
+            </a:r>
+            <a:endParaRPr lang="en-US"/>
+          </a:p>
+        </p:txBody>
+      </p:sp>
+      <p:sp>
+        <p:nvSpPr>
+          <p:cNvPr id="6" name="Fußzeilenplatzhalter 5"/>
+          <p:cNvSpPr>
+            <a:spLocks noGrp="1"/>
+          </p:cNvSpPr>
+          <p:nvPr>
+            <p:ph type="ftr" sz="quarter" idx="4"/>
+          </p:nvPr>
+        </p:nvSpPr>
+        <p:spPr>
+          <a:xfrm>
+            <a:off x="0" y="8685213"/>
+            <a:ext cx="2971800" cy="458787"/>
+          </a:xfrm>
+          <a:prstGeom prst="rect">
+            <a:avLst/>
+          </a:prstGeom>
+        </p:spPr>
+        <p:txBody>
+          <a:bodyPr vert="horz" lIns="91440" tIns="45720" rIns="91440" bIns="45720" rtlCol="0" anchor="b"/>
+          <a:lstStyle>
+            <a:lvl1pPr algn="l">
+              <a:defRPr sz="1200"/>
+            </a:lvl1pPr>
+          </a:lstStyle>
+          <a:p>
+            <a:endParaRPr lang="en-US"/>
+          </a:p>
+        </p:txBody>
+      </p:sp>
+      <p:sp>
+        <p:nvSpPr>
+          <p:cNvPr id="7" name="Foliennummernplatzhalter 6"/>
+          <p:cNvSpPr>
+            <a:spLocks noGrp="1"/>
+          </p:cNvSpPr>
+          <p:nvPr>
+            <p:ph type="sldNum" sz="quarter" idx="5"/>
+          </p:nvPr>
+        </p:nvSpPr>
+        <p:spPr>
+          <a:xfrm>
+            <a:off x="3884613" y="8685213"/>
+            <a:ext cx="2971800" cy="458787"/>
+          </a:xfrm>
+          <a:prstGeom prst="rect">
+            <a:avLst/>
+          </a:prstGeom>
+        </p:spPr>
+        <p:txBody>
+          <a:bodyPr vert="horz" lIns="91440" tIns="45720" rIns="91440" bIns="45720" rtlCol="0" anchor="b"/>
+          <a:lstStyle>
+            <a:lvl1pPr algn="r">
+              <a:defRPr sz="1200"/>
+            </a:lvl1pPr>
+          </a:lstStyle>
+          <a:p>
+            <a:fld id="{DAD22469-3237-6341-8F96-F3BC8D86C935}" type="slidenum">
+              <a:rPr lang="en-US" smtClean="0"/>
+              <a:t>‹Nr.›</a:t>
+            </a:fld>
+            <a:endParaRPr lang="en-US"/>
+          </a:p>
+        </p:txBody>
+      </p:sp>
+    </p:spTree>
+    <p:extLst>
+      <p:ext uri="{BB962C8B-B14F-4D97-AF65-F5344CB8AC3E}">
+        <p14:creationId xmlns:p14="http://schemas.microsoft.com/office/powerpoint/2010/main" val="2187675592"/>
+      </p:ext>
+    </p:extLst>
+  </p:cSld>
+  <p:clrMap bg1="lt1" tx1="dk1" bg2="lt2" tx2="dk2" accent1="accent1" accent2="accent2" accent3="accent3" accent4="accent4" accent5="accent5" accent6="accent6" hlink="hlink" folHlink="folHlink"/>
+  <p:notesStyle>
+    <a:lvl1pPr marL="0" algn="l" defTabSz="914400" rtl="0" eaLnBrk="1" latinLnBrk="0" hangingPunct="1">
+      <a:defRPr sz="1200" kern="1200">
+        <a:solidFill>
+          <a:schemeClr val="tx1"/>
+        </a:solidFill>
+        <a:latin typeface="+mn-lt"/>
+        <a:ea typeface="+mn-ea"/>
+        <a:cs typeface="+mn-cs"/>
+      </a:defRPr>
+    </a:lvl1pPr>
+    <a:lvl2pPr marL="457200" algn="l" defTabSz="914400" rtl="0" eaLnBrk="1" latinLnBrk="0" hangingPunct="1">
+      <a:defRPr sz="1200" kern="1200">
+        <a:solidFill>
+          <a:schemeClr val="tx1"/>
+        </a:solidFill>
+        <a:latin typeface="+mn-lt"/>
+        <a:ea typeface="+mn-ea"/>
+        <a:cs typeface="+mn-cs"/>
+      </a:defRPr>
+    </a:lvl2pPr>
+    <a:lvl3pPr marL="914400" algn="l" defTabSz="914400" rtl="0" eaLnBrk="1" latinLnBrk="0" hangingPunct="1">
+      <a:defRPr sz="1200" kern="1200">
+        <a:solidFill>
+          <a:schemeClr val="tx1"/>
+        </a:solidFill>
+        <a:latin typeface="+mn-lt"/>
+        <a:ea typeface="+mn-ea"/>
+        <a:cs typeface="+mn-cs"/>
+      </a:defRPr>
+    </a:lvl3pPr>
+    <a:lvl4pPr marL="1371600" algn="l" defTabSz="914400" rtl="0" eaLnBrk="1" latinLnBrk="0" hangingPunct="1">
+      <a:defRPr sz="1200" kern="1200">
+        <a:solidFill>
+          <a:schemeClr val="tx1"/>
+        </a:solidFill>
+        <a:latin typeface="+mn-lt"/>
+        <a:ea typeface="+mn-ea"/>
+        <a:cs typeface="+mn-cs"/>
+      </a:defRPr>
+    </a:lvl4pPr>
+    <a:lvl5pPr marL="1828800" algn="l" defTabSz="914400" rtl="0" eaLnBrk="1" latinLnBrk="0" hangingPunct="1">
+      <a:defRPr sz="1200" kern="1200">
+        <a:solidFill>
+          <a:schemeClr val="tx1"/>
+        </a:solidFill>
+        <a:latin typeface="+mn-lt"/>
+        <a:ea typeface="+mn-ea"/>
+        <a:cs typeface="+mn-cs"/>
+      </a:defRPr>
+    </a:lvl5pPr>
+    <a:lvl6pPr marL="2286000" algn="l" defTabSz="914400" rtl="0" eaLnBrk="1" latinLnBrk="0" hangingPunct="1">
+      <a:defRPr sz="1200" kern="1200">
+        <a:solidFill>
+          <a:schemeClr val="tx1"/>
+        </a:solidFill>
+        <a:latin typeface="+mn-lt"/>
+        <a:ea typeface="+mn-ea"/>
+        <a:cs typeface="+mn-cs"/>
+      </a:defRPr>
+    </a:lvl6pPr>
+    <a:lvl7pPr marL="2743200" algn="l" defTabSz="914400" rtl="0" eaLnBrk="1" latinLnBrk="0" hangingPunct="1">
+      <a:defRPr sz="1200" kern="1200">
+        <a:solidFill>
+          <a:schemeClr val="tx1"/>
+        </a:solidFill>
+        <a:latin typeface="+mn-lt"/>
+        <a:ea typeface="+mn-ea"/>
+        <a:cs typeface="+mn-cs"/>
+      </a:defRPr>
+    </a:lvl7pPr>
+    <a:lvl8pPr marL="3200400" algn="l" defTabSz="914400" rtl="0" eaLnBrk="1" latinLnBrk="0" hangingPunct="1">
+      <a:defRPr sz="1200" kern="1200">
+        <a:solidFill>
+          <a:schemeClr val="tx1"/>
+        </a:solidFill>
+        <a:latin typeface="+mn-lt"/>
+        <a:ea typeface="+mn-ea"/>
+        <a:cs typeface="+mn-cs"/>
+      </a:defRPr>
+    </a:lvl8pPr>
+    <a:lvl9pPr marL="3657600" algn="l" defTabSz="914400" rtl="0" eaLnBrk="1" latinLnBrk="0" hangingPunct="1">
+      <a:defRPr sz="1200" kern="1200">
+        <a:solidFill>
+          <a:schemeClr val="tx1"/>
+        </a:solidFill>
+        <a:latin typeface="+mn-lt"/>
+        <a:ea typeface="+mn-ea"/>
+        <a:cs typeface="+mn-cs"/>
+      </a:defRPr>
+    </a:lvl9pPr>
+  </p:notesStyle>
+</p:notesMaster>
+</file>
+
+<file path=ppt/notesSlides/notesSlide1.xml><?xml version="1.0" encoding="utf-8"?>
+<p:notes xmlns:a="http://schemas.openxmlformats.org/drawingml/2006/main" xmlns:r="http://schemas.openxmlformats.org/officeDocument/2006/relationships" xmlns:p="http://schemas.openxmlformats.org/presentationml/2006/main">
+  <p:cSld>
+    <p:spTree>
+      <p:nvGrpSpPr>
+        <p:cNvPr id="1" name=""/>
+        <p:cNvGrpSpPr/>
+        <p:nvPr/>
+      </p:nvGrpSpPr>
+      <p:grpSpPr>
+        <a:xfrm>
+          <a:off x="0" y="0"/>
+          <a:ext cx="0" cy="0"/>
+          <a:chOff x="0" y="0"/>
+          <a:chExt cx="0" cy="0"/>
+        </a:xfrm>
+      </p:grpSpPr>
+      <p:sp>
+        <p:nvSpPr>
+          <p:cNvPr id="2" name="Folienbildplatzhalter 1"/>
+          <p:cNvSpPr>
+            <a:spLocks noGrp="1" noRot="1" noChangeAspect="1"/>
+          </p:cNvSpPr>
+          <p:nvPr>
+            <p:ph type="sldImg"/>
+          </p:nvPr>
+        </p:nvSpPr>
+        <p:spPr/>
+      </p:sp>
+      <p:sp>
+        <p:nvSpPr>
+          <p:cNvPr id="3" name="Notizenplatzhalter 2"/>
+          <p:cNvSpPr>
+            <a:spLocks noGrp="1"/>
+          </p:cNvSpPr>
+          <p:nvPr>
+            <p:ph type="body" idx="1"/>
+          </p:nvPr>
+        </p:nvSpPr>
+        <p:spPr/>
+        <p:txBody>
+          <a:bodyPr/>
+          <a:lstStyle/>
+          <a:p>
+            <a:endParaRPr lang="en-US" dirty="0"/>
+          </a:p>
+        </p:txBody>
+      </p:sp>
+      <p:sp>
+        <p:nvSpPr>
+          <p:cNvPr id="4" name="Foliennummernplatzhalter 3"/>
+          <p:cNvSpPr>
+            <a:spLocks noGrp="1"/>
+          </p:cNvSpPr>
+          <p:nvPr>
+            <p:ph type="sldNum" sz="quarter" idx="5"/>
+          </p:nvPr>
+        </p:nvSpPr>
+        <p:spPr/>
+        <p:txBody>
+          <a:bodyPr/>
+          <a:lstStyle/>
+          <a:p>
+            <a:fld id="{DAD22469-3237-6341-8F96-F3BC8D86C935}" type="slidenum">
+              <a:rPr lang="en-US" smtClean="0"/>
+              <a:t>1</a:t>
+            </a:fld>
+            <a:endParaRPr lang="en-US"/>
+          </a:p>
+        </p:txBody>
+      </p:sp>
+    </p:spTree>
+    <p:extLst>
+      <p:ext uri="{BB962C8B-B14F-4D97-AF65-F5344CB8AC3E}">
+        <p14:creationId xmlns:p14="http://schemas.microsoft.com/office/powerpoint/2010/main" val="4223220918"/>
+      </p:ext>
+    </p:extLst>
+  </p:cSld>
+  <p:clrMapOvr>
+    <a:masterClrMapping/>
+  </p:clrMapOvr>
+</p:notes>
+</file>
+
 <file path=ppt/slideLayouts/slideLayout1.xml><?xml version="1.0" encoding="utf-8"?>
 <p:sldLayout xmlns:a="http://schemas.openxmlformats.org/drawingml/2006/main" xmlns:r="http://schemas.openxmlformats.org/officeDocument/2006/relationships" xmlns:p="http://schemas.openxmlformats.org/presentationml/2006/main" preserve="1" userDrawn="1">
   <p:cSld name="Titelfolie">
@@ -535,7 +972,7 @@
           </a:ln>
           <a:extLst>
             <a:ext uri="{C572A759-6A51-4108-AA02-DFA0A04FC94B}">
-              <ma14:wrappingTextBoxFlag xmlns="" xmlns:ma14="http://schemas.microsoft.com/office/mac/drawingml/2011/main" val="1"/>
+              <ma14:wrappingTextBoxFlag xmlns:ma14="http://schemas.microsoft.com/office/mac/drawingml/2011/main" xmlns="" val="1"/>
             </a:ext>
           </a:extLst>
         </p:spPr>
@@ -887,7 +1324,7 @@
           <a:p>
             <a:fld id="{FF5B2BAF-DF38-0A48-A798-0C06E514FD52}" type="datetimeFigureOut">
               <a:rPr lang="de-DE" smtClean="0"/>
-              <a:t>27.07.23</a:t>
+              <a:t>25.07.24</a:t>
             </a:fld>
             <a:endParaRPr lang="de-DE" dirty="0"/>
           </a:p>
@@ -1107,7 +1544,7 @@
           <a:p>
             <a:fld id="{FF5B2BAF-DF38-0A48-A798-0C06E514FD52}" type="datetimeFigureOut">
               <a:rPr lang="de-DE" smtClean="0"/>
-              <a:t>27.07.23</a:t>
+              <a:t>25.07.24</a:t>
             </a:fld>
             <a:endParaRPr lang="de-DE" dirty="0"/>
           </a:p>
@@ -1775,28 +2212,44 @@
             <p:ph idx="13"/>
           </p:nvPr>
         </p:nvSpPr>
-        <p:spPr/>
+        <p:spPr>
+          <a:xfrm>
+            <a:off x="858838" y="1436667"/>
+            <a:ext cx="6217465" cy="3803542"/>
+          </a:xfrm>
+        </p:spPr>
         <p:txBody>
           <a:bodyPr>
             <a:noAutofit/>
           </a:bodyPr>
           <a:lstStyle/>
           <a:p>
-            <a:r>
-              <a:rPr lang="de-DE" dirty="0"/>
-              <a:t>Kennst du das, dass der gefühlte Berg an Arbeit riesig ist, und Du ihn sowieso nicht abtragen kannst, egal was Du tust? Oder Du hast so viele Baustellen zu bedienen, dass Du überhaupt nicht weißt, wo Du anfangen sollst, und dann verlierst Du Dich?</a:t>
-            </a:r>
-          </a:p>
-          <a:p>
-            <a:r>
-              <a:rPr lang="de-DE" dirty="0"/>
-              <a:t>Dieses Gefühl kann Einiges von Deiner Gedankenkapazität verbrauchen. Immer wieder denkst Du darüber nach, was Du denn jetzt noch tun musst, was als nächstes wichtig ist. Diese Kapazität steht Dir für andere Bereiche nicht mehr zur Verfügung.</a:t>
-            </a:r>
-          </a:p>
-          <a:p>
-            <a:r>
-              <a:rPr lang="de-DE" dirty="0"/>
-              <a:t>In der Softwareentwicklung gibt es das so genannte “</a:t>
+            <a:pPr algn="just"/>
+            <a:r>
+              <a:rPr lang="de-DE" dirty="0"/>
+              <a:t>Kennst du das, dass der gefühlte Berg an Arbeit riesig ist, und Du ihn sowieso nicht abtragen kannst, egal was Du tust? Hast Du hast so viele Baustellen zu bedienen, dass Du den Überblick verlierst? Oder fehlt dir ein Platz, an dem Du gute Ideen einfangen und weiterentwickeln kannst?</a:t>
+            </a:r>
+          </a:p>
+          <a:p>
+            <a:pPr algn="just"/>
+            <a:r>
+              <a:rPr lang="de-DE" dirty="0"/>
+              <a:t>Dieser Zustand kann Einiges von Deiner Gedankenkapazität verbrauchen. Immer wieder denkst Du darüber nach, was Du denn jetzt noch tun musst oder dir schwirren immer wieder die gleichen Ideen im Kopf herum, weil sie nicht vergessen werden wollen. Diese Denk-Kapazität steht Dir für andere Bereiche nicht mehr zur Verfügung.</a:t>
+            </a:r>
+          </a:p>
+          <a:p>
+            <a:pPr algn="just"/>
+            <a:r>
+              <a:rPr lang="de-DE" dirty="0"/>
+              <a:t>Im Software-Framework </a:t>
+            </a:r>
+            <a:r>
+              <a:rPr lang="de-DE" dirty="0" err="1"/>
+              <a:t>Scrum</a:t>
+            </a:r>
+            <a:r>
+              <a:rPr lang="de-DE" dirty="0"/>
+              <a:t> gibt es das so genannte “</a:t>
             </a:r>
             <a:r>
               <a:rPr lang="de-DE" dirty="0" err="1"/>
@@ -1804,7 +2257,37 @@
             </a:r>
             <a:r>
               <a:rPr lang="de-DE" dirty="0"/>
-              <a:t> </a:t>
+              <a:t> Backlog“ (vgl. </a:t>
+            </a:r>
+            <a:r>
+              <a:rPr lang="de-DE" dirty="0" err="1"/>
+              <a:t>Schwaber</a:t>
+            </a:r>
+            <a:r>
+              <a:rPr lang="de-DE" dirty="0"/>
+              <a:t>/Sutherland, S. 11). Das ist eine „emergente, geordnete Liste der Dinge, dir zur Produktverbesserung benötigt werden“ (ebd., S. 11). </a:t>
+            </a:r>
+          </a:p>
+          <a:p>
+            <a:pPr algn="just"/>
+            <a:r>
+              <a:rPr lang="de-DE" dirty="0"/>
+              <a:t>Es kann Dir dabei helfen dem Berg an Arbeit oder deinen vielfältigen (Übe-)Ideen einen Platz in Deinem Leben zu geben, der nicht in Deinem Kopf ist. Das kann ein echter physischen Platz sein, z.B. bunte Post </a:t>
+            </a:r>
+            <a:r>
+              <a:rPr lang="de-DE" dirty="0" err="1"/>
+              <a:t>Its</a:t>
+            </a:r>
+            <a:r>
+              <a:rPr lang="de-DE" dirty="0"/>
+              <a:t> an der Wand in einem Zimmer, in dem Du oft bist, oder ein digitaler in Deinem Handy oder Computer.</a:t>
+            </a:r>
+          </a:p>
+          <a:p>
+            <a:pPr algn="just"/>
+            <a:r>
+              <a:rPr lang="de-DE" dirty="0"/>
+              <a:t>Du entwirfst Dein </a:t>
             </a:r>
             <a:r>
               <a:rPr lang="de-DE" dirty="0" err="1"/>
@@ -1812,54 +2295,11 @@
             </a:r>
             <a:r>
               <a:rPr lang="de-DE" dirty="0"/>
-              <a:t>". Ein </a:t>
-            </a:r>
-            <a:r>
-              <a:rPr lang="de-DE" dirty="0" err="1"/>
-              <a:t>Backlog</a:t>
-            </a:r>
-            <a:r>
-              <a:rPr lang="de-DE" dirty="0"/>
-              <a:t> ist nichts anderes als eine priorisierte </a:t>
-            </a:r>
-            <a:r>
-              <a:rPr lang="de-DE" dirty="0" err="1"/>
-              <a:t>To</a:t>
-            </a:r>
-            <a:r>
-              <a:rPr lang="de-DE" dirty="0"/>
-              <a:t>-Do Liste. </a:t>
-            </a:r>
-          </a:p>
-          <a:p>
-            <a:r>
-              <a:rPr lang="de-DE" dirty="0"/>
-              <a:t>Es kann Dir dabei helfen dem Berg an Arbeit einen Platz in Deinem Leben zu geben, der nicht in Deinem Kopf ist. Das kann ein echter physischen Platz sein, z.B. bunte Post </a:t>
-            </a:r>
-            <a:r>
-              <a:rPr lang="de-DE" dirty="0" err="1"/>
-              <a:t>Its</a:t>
-            </a:r>
-            <a:r>
-              <a:rPr lang="de-DE" dirty="0"/>
-              <a:t> an der Wand in einem Zimmer, in dem Du oft bist, oder ein digitaler in Deinem Handy oder Computer.</a:t>
-            </a:r>
-          </a:p>
-          <a:p>
-            <a:r>
-              <a:rPr lang="de-DE" dirty="0"/>
-              <a:t>Du entwirfst Dein </a:t>
-            </a:r>
-            <a:r>
-              <a:rPr lang="de-DE" dirty="0" err="1"/>
-              <a:t>Backlog</a:t>
-            </a:r>
-            <a:r>
-              <a:rPr lang="de-DE" dirty="0"/>
               <a:t>, indem Du Dich Deinen Aufgaben aus der Vogelperspektive näherst. </a:t>
             </a:r>
           </a:p>
           <a:p>
+            <a:pPr algn="just"/>
             <a:r>
               <a:rPr lang="de-DE" dirty="0"/>
               <a:t>Betrachte Dein Leben und finde Deine Projekte, die Du gerade fertigstellen musst. Das sind Deine so genannten "</a:t>
@@ -1870,18 +2310,11 @@
             </a:r>
             <a:r>
               <a:rPr lang="de-DE" dirty="0"/>
-              <a:t>" - große Aufgabenbrocken, die zwar irgendwann ihren Abschluss finden, aber nicht auf einmal </a:t>
-            </a:r>
-            <a:r>
-              <a:rPr lang="de-DE" dirty="0" err="1"/>
-              <a:t>stemmbar</a:t>
-            </a:r>
-            <a:r>
-              <a:rPr lang="de-DE" dirty="0"/>
-              <a:t> sind.</a:t>
-            </a:r>
-          </a:p>
-          <a:p>
+              <a:t>" - große Aufgabenbrocken, die zwar irgendwann ihren Abschluss finden, aber nicht an einem Tag erledigt werden können.</a:t>
+            </a:r>
+          </a:p>
+          <a:p>
+            <a:pPr algn="just"/>
             <a:r>
               <a:rPr lang="de-DE" dirty="0"/>
               <a:t>Jedes </a:t>
@@ -1892,15 +2325,72 @@
             </a:r>
             <a:r>
               <a:rPr lang="de-DE" dirty="0"/>
-              <a:t> hat mehrere "User Stories“. Das sind Aufgaben, die überschaubar und ein in sich geschlossener Teil vom großen Ganzen sind. Z.B. wenn Du einen Song schreibst, sind die Lyrics eine User Story und das fertige Stück wäre der </a:t>
-            </a:r>
-            <a:r>
-              <a:rPr lang="de-DE" dirty="0" err="1"/>
-              <a:t>Epic</a:t>
-            </a:r>
-            <a:r>
-              <a:rPr lang="de-DE" dirty="0"/>
-              <a:t>.</a:t>
+              <a:t> hat mehrere "User Stories“. Das sind Aufgaben, die überschaubar und ein in sich geschlossener Teil vom großen Ganzen sind. Z.B. wenn Du einen Song schreibst, sind die Lyrics eine User Story und das fertige Stück wäre der Epic.</a:t>
+            </a:r>
+          </a:p>
+          <a:p>
+            <a:pPr marL="0" indent="0">
+              <a:buNone/>
+            </a:pPr>
+            <a:r>
+              <a:rPr lang="de-DE" sz="300" dirty="0"/>
+              <a:t>   </a:t>
+            </a:r>
+          </a:p>
+          <a:p>
+            <a:pPr marL="0" indent="0" algn="just">
+              <a:buNone/>
+            </a:pPr>
+            <a:r>
+              <a:rPr lang="de-DE" sz="800" dirty="0"/>
+              <a:t>Quelle:  </a:t>
+            </a:r>
+            <a:r>
+              <a:rPr lang="de-DE" sz="800" dirty="0" err="1"/>
+              <a:t>Schwaber</a:t>
+            </a:r>
+            <a:r>
+              <a:rPr lang="de-DE" sz="800" dirty="0"/>
+              <a:t>/Sutherland (2020): Der </a:t>
+            </a:r>
+            <a:r>
+              <a:rPr lang="de-DE" sz="800" dirty="0" err="1"/>
+              <a:t>Scrum</a:t>
+            </a:r>
+            <a:r>
+              <a:rPr lang="de-DE" sz="800" dirty="0"/>
+              <a:t> Guide. Der gültige Leitfaden für </a:t>
+            </a:r>
+            <a:r>
+              <a:rPr lang="de-DE" sz="800" dirty="0" err="1"/>
+              <a:t>Scrum</a:t>
+            </a:r>
+            <a:r>
+              <a:rPr lang="de-DE" sz="800" dirty="0"/>
+              <a:t>: Die Spielregeln. http://scrumguides.org/ </a:t>
+            </a:r>
+            <a:br>
+              <a:rPr lang="de-DE" sz="800" dirty="0"/>
+            </a:br>
+            <a:r>
+              <a:rPr lang="de-DE" sz="800" dirty="0"/>
+              <a:t>               </a:t>
+            </a:r>
+            <a:r>
+              <a:rPr lang="de-DE" sz="800" dirty="0" err="1"/>
+              <a:t>docs</a:t>
+            </a:r>
+            <a:r>
+              <a:rPr lang="de-DE" sz="800" dirty="0"/>
+              <a:t>/</a:t>
+            </a:r>
+            <a:r>
+              <a:rPr lang="de-DE" sz="800" dirty="0" err="1"/>
+              <a:t>scrumguide</a:t>
+            </a:r>
+            <a:r>
+              <a:rPr lang="de-DE" sz="800" dirty="0"/>
+              <a:t>/v2020/2020-Scrum-Guide-German.pdf. Abgerufen am 25. Juli 2024</a:t>
             </a:r>
           </a:p>
         </p:txBody>
@@ -1975,6 +2465,7 @@
           <a:bodyPr/>
           <a:lstStyle/>
           <a:p>
+            <a:pPr algn="just"/>
             <a:r>
               <a:rPr lang="de-DE" dirty="0"/>
               <a:t>Brainstorme 3-5 Mal innerhalb von 2 Wochen </a:t>
@@ -1997,6 +2488,7 @@
             </a:r>
           </a:p>
           <a:p>
+            <a:pPr algn="just"/>
             <a:r>
               <a:rPr lang="de-DE" dirty="0"/>
               <a:t>Brainstorme und erweitere Dein </a:t>
@@ -2011,6 +2503,7 @@
             </a:r>
           </a:p>
           <a:p>
+            <a:pPr algn="just"/>
             <a:r>
               <a:rPr lang="de-DE" dirty="0"/>
               <a:t>Finde einen Ort für Dein </a:t>
@@ -2441,4 +2934,319 @@
   </a:objectDefaults>
   <a:extraClrSchemeLst/>
 </a:theme>
+</file>
+
+<file path=ppt/theme/theme2.xml><?xml version="1.0" encoding="utf-8"?>
+<a:theme xmlns:a="http://schemas.openxmlformats.org/drawingml/2006/main" name="Office">
+  <a:themeElements>
+    <a:clrScheme name="Office">
+      <a:dk1>
+        <a:sysClr val="windowText" lastClr="000000"/>
+      </a:dk1>
+      <a:lt1>
+        <a:sysClr val="window" lastClr="FFFFFF"/>
+      </a:lt1>
+      <a:dk2>
+        <a:srgbClr val="0E2841"/>
+      </a:dk2>
+      <a:lt2>
+        <a:srgbClr val="E8E8E8"/>
+      </a:lt2>
+      <a:accent1>
+        <a:srgbClr val="156082"/>
+      </a:accent1>
+      <a:accent2>
+        <a:srgbClr val="E97132"/>
+      </a:accent2>
+      <a:accent3>
+        <a:srgbClr val="196B24"/>
+      </a:accent3>
+      <a:accent4>
+        <a:srgbClr val="0F9ED5"/>
+      </a:accent4>
+      <a:accent5>
+        <a:srgbClr val="A02B93"/>
+      </a:accent5>
+      <a:accent6>
+        <a:srgbClr val="4EA72E"/>
+      </a:accent6>
+      <a:hlink>
+        <a:srgbClr val="467886"/>
+      </a:hlink>
+      <a:folHlink>
+        <a:srgbClr val="96607D"/>
+      </a:folHlink>
+    </a:clrScheme>
+    <a:fontScheme name="Office">
+      <a:majorFont>
+        <a:latin typeface="Aptos Display" panose="02110004020202020204"/>
+        <a:ea typeface=""/>
+        <a:cs typeface=""/>
+        <a:font script="Jpan" typeface="游ゴシック Light"/>
+        <a:font script="Hang" typeface="맑은 고딕"/>
+        <a:font script="Hans" typeface="等线 Light"/>
+        <a:font script="Hant" typeface="新細明體"/>
+        <a:font script="Arab" typeface="Times New Roman"/>
+        <a:font script="Hebr" typeface="Times New Roman"/>
+        <a:font script="Thai" typeface="Angsana New"/>
+        <a:font script="Ethi" typeface="Nyala"/>
+        <a:font script="Beng" typeface="Vrinda"/>
+        <a:font script="Gujr" typeface="Shruti"/>
+        <a:font script="Khmr" typeface="MoolBoran"/>
+        <a:font script="Knda" typeface="Tunga"/>
+        <a:font script="Guru" typeface="Raavi"/>
+        <a:font script="Cans" typeface="Euphemia"/>
+        <a:font script="Cher" typeface="Plantagenet Cherokee"/>
+        <a:font script="Yiii" typeface="Microsoft Yi Baiti"/>
+        <a:font script="Tibt" typeface="Microsoft Himalaya"/>
+        <a:font script="Thaa" typeface="MV Boli"/>
+        <a:font script="Deva" typeface="Mangal"/>
+        <a:font script="Telu" typeface="Gautami"/>
+        <a:font script="Taml" typeface="Latha"/>
+        <a:font script="Syrc" typeface="Estrangelo Edessa"/>
+        <a:font script="Orya" typeface="Kalinga"/>
+        <a:font script="Mlym" typeface="Kartika"/>
+        <a:font script="Laoo" typeface="DokChampa"/>
+        <a:font script="Sinh" typeface="Iskoola Pota"/>
+        <a:font script="Mong" typeface="Mongolian Baiti"/>
+        <a:font script="Viet" typeface="Times New Roman"/>
+        <a:font script="Uigh" typeface="Microsoft Uighur"/>
+        <a:font script="Geor" typeface="Sylfaen"/>
+        <a:font script="Armn" typeface="Arial"/>
+        <a:font script="Bugi" typeface="Leelawadee UI"/>
+        <a:font script="Bopo" typeface="Microsoft JhengHei"/>
+        <a:font script="Java" typeface="Javanese Text"/>
+        <a:font script="Lisu" typeface="Segoe UI"/>
+        <a:font script="Mymr" typeface="Myanmar Text"/>
+        <a:font script="Nkoo" typeface="Ebrima"/>
+        <a:font script="Olck" typeface="Nirmala UI"/>
+        <a:font script="Osma" typeface="Ebrima"/>
+        <a:font script="Phag" typeface="Phagspa"/>
+        <a:font script="Syrn" typeface="Estrangelo Edessa"/>
+        <a:font script="Syrj" typeface="Estrangelo Edessa"/>
+        <a:font script="Syre" typeface="Estrangelo Edessa"/>
+        <a:font script="Sora" typeface="Nirmala UI"/>
+        <a:font script="Tale" typeface="Microsoft Tai Le"/>
+        <a:font script="Talu" typeface="Microsoft New Tai Lue"/>
+        <a:font script="Tfng" typeface="Ebrima"/>
+      </a:majorFont>
+      <a:minorFont>
+        <a:latin typeface="Aptos" panose="02110004020202020204"/>
+        <a:ea typeface=""/>
+        <a:cs typeface=""/>
+        <a:font script="Jpan" typeface="游ゴシック"/>
+        <a:font script="Hang" typeface="맑은 고딕"/>
+        <a:font script="Hans" typeface="等线"/>
+        <a:font script="Hant" typeface="新細明體"/>
+        <a:font script="Arab" typeface="Arial"/>
+        <a:font script="Hebr" typeface="Arial"/>
+        <a:font script="Thai" typeface="Cordia New"/>
+        <a:font script="Ethi" typeface="Nyala"/>
+        <a:font script="Beng" typeface="Vrinda"/>
+        <a:font script="Gujr" typeface="Shruti"/>
+        <a:font script="Khmr" typeface="DaunPenh"/>
+        <a:font script="Knda" typeface="Tunga"/>
+        <a:font script="Guru" typeface="Raavi"/>
+        <a:font script="Cans" typeface="Euphemia"/>
+        <a:font script="Cher" typeface="Plantagenet Cherokee"/>
+        <a:font script="Yiii" typeface="Microsoft Yi Baiti"/>
+        <a:font script="Tibt" typeface="Microsoft Himalaya"/>
+        <a:font script="Thaa" typeface="MV Boli"/>
+        <a:font script="Deva" typeface="Mangal"/>
+        <a:font script="Telu" typeface="Gautami"/>
+        <a:font script="Taml" typeface="Latha"/>
+        <a:font script="Syrc" typeface="Estrangelo Edessa"/>
+        <a:font script="Orya" typeface="Kalinga"/>
+        <a:font script="Mlym" typeface="Kartika"/>
+        <a:font script="Laoo" typeface="DokChampa"/>
+        <a:font script="Sinh" typeface="Iskoola Pota"/>
+        <a:font script="Mong" typeface="Mongolian Baiti"/>
+        <a:font script="Viet" typeface="Arial"/>
+        <a:font script="Uigh" typeface="Microsoft Uighur"/>
+        <a:font script="Geor" typeface="Sylfaen"/>
+        <a:font script="Armn" typeface="Arial"/>
+        <a:font script="Bugi" typeface="Leelawadee UI"/>
+        <a:font script="Bopo" typeface="Microsoft JhengHei"/>
+        <a:font script="Java" typeface="Javanese Text"/>
+        <a:font script="Lisu" typeface="Segoe UI"/>
+        <a:font script="Mymr" typeface="Myanmar Text"/>
+        <a:font script="Nkoo" typeface="Ebrima"/>
+        <a:font script="Olck" typeface="Nirmala UI"/>
+        <a:font script="Osma" typeface="Ebrima"/>
+        <a:font script="Phag" typeface="Phagspa"/>
+        <a:font script="Syrn" typeface="Estrangelo Edessa"/>
+        <a:font script="Syrj" typeface="Estrangelo Edessa"/>
+        <a:font script="Syre" typeface="Estrangelo Edessa"/>
+        <a:font script="Sora" typeface="Nirmala UI"/>
+        <a:font script="Tale" typeface="Microsoft Tai Le"/>
+        <a:font script="Talu" typeface="Microsoft New Tai Lue"/>
+        <a:font script="Tfng" typeface="Ebrima"/>
+      </a:minorFont>
+    </a:fontScheme>
+    <a:fmtScheme name="Office">
+      <a:fillStyleLst>
+        <a:solidFill>
+          <a:schemeClr val="phClr"/>
+        </a:solidFill>
+        <a:gradFill rotWithShape="1">
+          <a:gsLst>
+            <a:gs pos="0">
+              <a:schemeClr val="phClr">
+                <a:lumMod val="110000"/>
+                <a:satMod val="105000"/>
+                <a:tint val="67000"/>
+              </a:schemeClr>
+            </a:gs>
+            <a:gs pos="50000">
+              <a:schemeClr val="phClr">
+                <a:lumMod val="105000"/>
+                <a:satMod val="103000"/>
+                <a:tint val="73000"/>
+              </a:schemeClr>
+            </a:gs>
+            <a:gs pos="100000">
+              <a:schemeClr val="phClr">
+                <a:lumMod val="105000"/>
+                <a:satMod val="109000"/>
+                <a:tint val="81000"/>
+              </a:schemeClr>
+            </a:gs>
+          </a:gsLst>
+          <a:lin ang="5400000" scaled="0"/>
+        </a:gradFill>
+        <a:gradFill rotWithShape="1">
+          <a:gsLst>
+            <a:gs pos="0">
+              <a:schemeClr val="phClr">
+                <a:satMod val="103000"/>
+                <a:lumMod val="102000"/>
+                <a:tint val="94000"/>
+              </a:schemeClr>
+            </a:gs>
+            <a:gs pos="50000">
+              <a:schemeClr val="phClr">
+                <a:satMod val="110000"/>
+                <a:lumMod val="100000"/>
+                <a:shade val="100000"/>
+              </a:schemeClr>
+            </a:gs>
+            <a:gs pos="100000">
+              <a:schemeClr val="phClr">
+                <a:lumMod val="99000"/>
+                <a:satMod val="120000"/>
+                <a:shade val="78000"/>
+              </a:schemeClr>
+            </a:gs>
+          </a:gsLst>
+          <a:lin ang="5400000" scaled="0"/>
+        </a:gradFill>
+      </a:fillStyleLst>
+      <a:lnStyleLst>
+        <a:ln w="12700" cap="flat" cmpd="sng" algn="ctr">
+          <a:solidFill>
+            <a:schemeClr val="phClr"/>
+          </a:solidFill>
+          <a:prstDash val="solid"/>
+          <a:miter lim="800000"/>
+        </a:ln>
+        <a:ln w="19050" cap="flat" cmpd="sng" algn="ctr">
+          <a:solidFill>
+            <a:schemeClr val="phClr"/>
+          </a:solidFill>
+          <a:prstDash val="solid"/>
+          <a:miter lim="800000"/>
+        </a:ln>
+        <a:ln w="25400" cap="flat" cmpd="sng" algn="ctr">
+          <a:solidFill>
+            <a:schemeClr val="phClr"/>
+          </a:solidFill>
+          <a:prstDash val="solid"/>
+          <a:miter lim="800000"/>
+        </a:ln>
+      </a:lnStyleLst>
+      <a:effectStyleLst>
+        <a:effectStyle>
+          <a:effectLst/>
+        </a:effectStyle>
+        <a:effectStyle>
+          <a:effectLst/>
+        </a:effectStyle>
+        <a:effectStyle>
+          <a:effectLst>
+            <a:outerShdw blurRad="57150" dist="19050" dir="5400000" algn="ctr" rotWithShape="0">
+              <a:srgbClr val="000000">
+                <a:alpha val="63000"/>
+              </a:srgbClr>
+            </a:outerShdw>
+          </a:effectLst>
+        </a:effectStyle>
+      </a:effectStyleLst>
+      <a:bgFillStyleLst>
+        <a:solidFill>
+          <a:schemeClr val="phClr"/>
+        </a:solidFill>
+        <a:solidFill>
+          <a:schemeClr val="phClr">
+            <a:tint val="95000"/>
+            <a:satMod val="170000"/>
+          </a:schemeClr>
+        </a:solidFill>
+        <a:gradFill rotWithShape="1">
+          <a:gsLst>
+            <a:gs pos="0">
+              <a:schemeClr val="phClr">
+                <a:tint val="93000"/>
+                <a:satMod val="150000"/>
+                <a:shade val="98000"/>
+                <a:lumMod val="102000"/>
+              </a:schemeClr>
+            </a:gs>
+            <a:gs pos="50000">
+              <a:schemeClr val="phClr">
+                <a:tint val="98000"/>
+                <a:satMod val="130000"/>
+                <a:shade val="90000"/>
+                <a:lumMod val="103000"/>
+              </a:schemeClr>
+            </a:gs>
+            <a:gs pos="100000">
+              <a:schemeClr val="phClr">
+                <a:shade val="63000"/>
+                <a:satMod val="120000"/>
+              </a:schemeClr>
+            </a:gs>
+          </a:gsLst>
+          <a:lin ang="5400000" scaled="0"/>
+        </a:gradFill>
+      </a:bgFillStyleLst>
+    </a:fmtScheme>
+  </a:themeElements>
+  <a:objectDefaults>
+    <a:lnDef>
+      <a:spPr/>
+      <a:bodyPr/>
+      <a:lstStyle/>
+      <a:style>
+        <a:lnRef idx="2">
+          <a:schemeClr val="accent1"/>
+        </a:lnRef>
+        <a:fillRef idx="0">
+          <a:schemeClr val="accent1"/>
+        </a:fillRef>
+        <a:effectRef idx="1">
+          <a:schemeClr val="accent1"/>
+        </a:effectRef>
+        <a:fontRef idx="minor">
+          <a:schemeClr val="tx1"/>
+        </a:fontRef>
+      </a:style>
+    </a:lnDef>
+  </a:objectDefaults>
+  <a:extraClrSchemeLst/>
+  <a:extLst>
+    <a:ext uri="{05A4C25C-085E-4340-85A3-A5531E510DB2}">
+      <thm15:themeFamily xmlns:thm15="http://schemas.microsoft.com/office/thememl/2012/main" name="Office Theme" id="{2E142A2C-CD16-42D6-873A-C26D2A0506FA}" vid="{1BDDFF52-6CD6-40A5-AB3C-68EB2F1E4D0A}"/>
+    </a:ext>
+  </a:extLst>
+</a:theme>
 </file>
</xml_diff>

<commit_message>
SCR 10 Literaturangabe und Rechtschreibfehler verbessert
</commit_message>
<xml_diff>
--- a/training-cards/music moves/Scrum (SCR)/ger/apprentice/ger_SCR_10_Hubschrauberperspektive_MM_A.pptx
+++ b/training-cards/music moves/Scrum (SCR)/ger/apprentice/ger_SCR_10_Hubschrauberperspektive_MM_A.pptx
@@ -2215,7 +2215,7 @@
         <p:spPr>
           <a:xfrm>
             <a:off x="858838" y="1436667"/>
-            <a:ext cx="6217465" cy="3803542"/>
+            <a:ext cx="6283367" cy="3803542"/>
           </a:xfrm>
         </p:spPr>
         <p:txBody>
@@ -2226,106 +2226,106 @@
           <a:p>
             <a:pPr algn="just"/>
             <a:r>
-              <a:rPr lang="de-DE" dirty="0"/>
+              <a:rPr lang="de-DE" sz="950" dirty="0"/>
               <a:t>Kennst du das, dass der gefühlte Berg an Arbeit riesig ist, und Du ihn sowieso nicht abtragen kannst, egal was Du tust? Hast Du hast so viele Baustellen zu bedienen, dass Du den Überblick verlierst? Oder fehlt dir ein Platz, an dem Du gute Ideen einfangen und weiterentwickeln kannst?</a:t>
             </a:r>
           </a:p>
           <a:p>
             <a:pPr algn="just"/>
             <a:r>
-              <a:rPr lang="de-DE" dirty="0"/>
+              <a:rPr lang="de-DE" sz="950" dirty="0"/>
               <a:t>Dieser Zustand kann Einiges von Deiner Gedankenkapazität verbrauchen. Immer wieder denkst Du darüber nach, was Du denn jetzt noch tun musst oder dir schwirren immer wieder die gleichen Ideen im Kopf herum, weil sie nicht vergessen werden wollen. Diese Denk-Kapazität steht Dir für andere Bereiche nicht mehr zur Verfügung.</a:t>
             </a:r>
           </a:p>
           <a:p>
             <a:pPr algn="just"/>
             <a:r>
-              <a:rPr lang="de-DE" dirty="0"/>
+              <a:rPr lang="de-DE" sz="950" dirty="0"/>
               <a:t>Im Software-Framework </a:t>
             </a:r>
             <a:r>
-              <a:rPr lang="de-DE" dirty="0" err="1"/>
+              <a:rPr lang="de-DE" sz="950" dirty="0" err="1"/>
               <a:t>Scrum</a:t>
             </a:r>
             <a:r>
-              <a:rPr lang="de-DE" dirty="0"/>
-              <a:t> gibt es das so genannte “</a:t>
-            </a:r>
-            <a:r>
-              <a:rPr lang="de-DE" dirty="0" err="1"/>
+              <a:rPr lang="de-DE" sz="950" dirty="0"/>
+              <a:t> gibt es das so genannte „</a:t>
+            </a:r>
+            <a:r>
+              <a:rPr lang="de-DE" sz="950" dirty="0" err="1"/>
               <a:t>Product</a:t>
             </a:r>
             <a:r>
-              <a:rPr lang="de-DE" dirty="0"/>
+              <a:rPr lang="de-DE" sz="950" dirty="0"/>
               <a:t> Backlog“ (vgl. </a:t>
             </a:r>
             <a:r>
-              <a:rPr lang="de-DE" dirty="0" err="1"/>
+              <a:rPr lang="de-DE" sz="950" dirty="0" err="1"/>
               <a:t>Schwaber</a:t>
             </a:r>
             <a:r>
-              <a:rPr lang="de-DE" dirty="0"/>
-              <a:t>/Sutherland, S. 11). Das ist eine „emergente, geordnete Liste der Dinge, dir zur Produktverbesserung benötigt werden“ (ebd., S. 11). </a:t>
+              <a:rPr lang="de-DE" sz="950" dirty="0"/>
+              <a:t>/Sutherland 2020, S. 11). Das ist eine „emergente, geordnete Liste der Dinge, die zur Produktverbesserung benötigt werden“ (ebd., S. 11). </a:t>
             </a:r>
           </a:p>
           <a:p>
             <a:pPr algn="just"/>
             <a:r>
-              <a:rPr lang="de-DE" dirty="0"/>
+              <a:rPr lang="de-DE" sz="950" dirty="0"/>
               <a:t>Es kann Dir dabei helfen dem Berg an Arbeit oder deinen vielfältigen (Übe-)Ideen einen Platz in Deinem Leben zu geben, der nicht in Deinem Kopf ist. Das kann ein echter physischen Platz sein, z.B. bunte Post </a:t>
             </a:r>
             <a:r>
-              <a:rPr lang="de-DE" dirty="0" err="1"/>
+              <a:rPr lang="de-DE" sz="950" dirty="0" err="1"/>
               <a:t>Its</a:t>
             </a:r>
             <a:r>
-              <a:rPr lang="de-DE" dirty="0"/>
+              <a:rPr lang="de-DE" sz="950" dirty="0"/>
               <a:t> an der Wand in einem Zimmer, in dem Du oft bist, oder ein digitaler in Deinem Handy oder Computer.</a:t>
             </a:r>
           </a:p>
           <a:p>
             <a:pPr algn="just"/>
             <a:r>
-              <a:rPr lang="de-DE" dirty="0"/>
+              <a:rPr lang="de-DE" sz="950" dirty="0"/>
               <a:t>Du entwirfst Dein </a:t>
             </a:r>
             <a:r>
-              <a:rPr lang="de-DE" dirty="0" err="1"/>
+              <a:rPr lang="de-DE" sz="950" dirty="0" err="1"/>
               <a:t>Backlog</a:t>
             </a:r>
             <a:r>
-              <a:rPr lang="de-DE" dirty="0"/>
+              <a:rPr lang="de-DE" sz="950" dirty="0"/>
               <a:t>, indem Du Dich Deinen Aufgaben aus der Vogelperspektive näherst. </a:t>
             </a:r>
           </a:p>
           <a:p>
             <a:pPr algn="just"/>
             <a:r>
-              <a:rPr lang="de-DE" dirty="0"/>
-              <a:t>Betrachte Dein Leben und finde Deine Projekte, die Du gerade fertigstellen musst. Das sind Deine so genannten "</a:t>
-            </a:r>
-            <a:r>
-              <a:rPr lang="de-DE" dirty="0" err="1"/>
+              <a:rPr lang="de-DE" sz="950" dirty="0"/>
+              <a:t>Betrachte Dein Leben und finde Deine Projekte, die Du gerade fertigstellen möchtest. Das sind Deine sog. „</a:t>
+            </a:r>
+            <a:r>
+              <a:rPr lang="de-DE" sz="950" dirty="0" err="1"/>
               <a:t>Epics</a:t>
             </a:r>
             <a:r>
-              <a:rPr lang="de-DE" dirty="0"/>
-              <a:t>" - große Aufgabenbrocken, die zwar irgendwann ihren Abschluss finden, aber nicht an einem Tag erledigt werden können.</a:t>
+              <a:rPr lang="de-DE" sz="950" dirty="0"/>
+              <a:t>“ - große Aufgabenbrocken, die zwar irgendwann ihren Abschluss finden, aber nicht an einem Tag erledigt werden können und zuerst heruntergebrochen werden müssen (vgl. Patton 2014, S. 141).</a:t>
             </a:r>
           </a:p>
           <a:p>
             <a:pPr algn="just"/>
             <a:r>
-              <a:rPr lang="de-DE" dirty="0"/>
-              <a:t>Jedes </a:t>
-            </a:r>
-            <a:r>
-              <a:rPr lang="de-DE" dirty="0" err="1"/>
-              <a:t>Epic</a:t>
-            </a:r>
-            <a:r>
-              <a:rPr lang="de-DE" dirty="0"/>
-              <a:t> hat mehrere "User Stories“. Das sind Aufgaben, die überschaubar und ein in sich geschlossener Teil vom großen Ganzen sind. Z.B. wenn Du einen Song schreibst, sind die Lyrics eine User Story und das fertige Stück wäre der Epic.</a:t>
+              <a:rPr lang="de-DE" sz="950" dirty="0"/>
+              <a:t>Jedes Epic kann in sog. „User Stories“ heruntergebrochen werden. Sie sind leichtgewichtiger als </a:t>
+            </a:r>
+            <a:r>
+              <a:rPr lang="de-DE" sz="950" dirty="0" err="1"/>
+              <a:t>Epics</a:t>
+            </a:r>
+            <a:r>
+              <a:rPr lang="de-DE" sz="950" dirty="0"/>
+              <a:t>. In der Softwareentwicklung sind sie das Standardformat, mit dem Backlogs befüllt werden (vgl. Galen 2013, S.  69). Wenn Du z.B. einen Song schreibst, sind die Lyrics eine User Story und das fertige Stück wäre das Epic.</a:t>
             </a:r>
           </a:p>
           <a:p>
@@ -2333,8 +2333,153 @@
               <a:buNone/>
             </a:pPr>
             <a:r>
-              <a:rPr lang="de-DE" sz="300" dirty="0"/>
-              <a:t>   </a:t>
+              <a:rPr lang="de-DE" sz="100" dirty="0"/>
+              <a:t>     </a:t>
+            </a:r>
+          </a:p>
+          <a:p>
+            <a:pPr marL="0" indent="0">
+              <a:buNone/>
+            </a:pPr>
+            <a:r>
+              <a:rPr lang="de-DE" sz="650" dirty="0"/>
+              <a:t>Quellen:	Galen, Robert (2013): SCRUM </a:t>
+            </a:r>
+            <a:r>
+              <a:rPr lang="de-DE" sz="650" dirty="0" err="1"/>
+              <a:t>Product</a:t>
+            </a:r>
+            <a:r>
+              <a:rPr lang="de-DE" sz="650" dirty="0"/>
+              <a:t> Ownership. </a:t>
+            </a:r>
+            <a:r>
+              <a:rPr lang="de-DE" sz="650" dirty="0" err="1"/>
+              <a:t>Balancing</a:t>
+            </a:r>
+            <a:r>
+              <a:rPr lang="de-DE" sz="650" dirty="0"/>
+              <a:t> Value </a:t>
+            </a:r>
+            <a:r>
+              <a:rPr lang="de-DE" sz="650" dirty="0" err="1"/>
+              <a:t>from</a:t>
+            </a:r>
+            <a:r>
+              <a:rPr lang="de-DE" sz="650" dirty="0"/>
+              <a:t> </a:t>
+            </a:r>
+            <a:r>
+              <a:rPr lang="de-DE" sz="650" dirty="0" err="1"/>
+              <a:t>the</a:t>
+            </a:r>
+            <a:r>
+              <a:rPr lang="de-DE" sz="650" dirty="0"/>
+              <a:t> Inside Out. Stories, </a:t>
+            </a:r>
+            <a:r>
+              <a:rPr lang="de-DE" sz="650" dirty="0" err="1"/>
+              <a:t>Ideas</a:t>
+            </a:r>
+            <a:r>
+              <a:rPr lang="de-DE" sz="650" dirty="0"/>
+              <a:t>, </a:t>
+            </a:r>
+            <a:r>
+              <a:rPr lang="de-DE" sz="650" dirty="0" err="1"/>
+              <a:t>Lessons</a:t>
+            </a:r>
+            <a:r>
+              <a:rPr lang="de-DE" sz="650" dirty="0"/>
+              <a:t>, and Practices </a:t>
+            </a:r>
+            <a:r>
+              <a:rPr lang="de-DE" sz="650" dirty="0" err="1"/>
+              <a:t>for</a:t>
+            </a:r>
+            <a:r>
+              <a:rPr lang="de-DE" sz="650" dirty="0"/>
+              <a:t> </a:t>
+            </a:r>
+            <a:r>
+              <a:rPr lang="de-DE" sz="650" dirty="0" err="1"/>
+              <a:t>Becoming</a:t>
+            </a:r>
+            <a:r>
+              <a:rPr lang="de-DE" sz="650" dirty="0"/>
+              <a:t> a Great </a:t>
+            </a:r>
+            <a:r>
+              <a:rPr lang="de-DE" sz="650" dirty="0" err="1"/>
+              <a:t>Product</a:t>
+            </a:r>
+            <a:r>
+              <a:rPr lang="de-DE" sz="650" dirty="0"/>
+              <a:t> </a:t>
+            </a:r>
+            <a:br>
+              <a:rPr lang="de-DE" sz="650" dirty="0"/>
+            </a:br>
+            <a:r>
+              <a:rPr lang="de-DE" sz="650" dirty="0"/>
+              <a:t>	</a:t>
+            </a:r>
+            <a:r>
+              <a:rPr lang="de-DE" sz="650" dirty="0" err="1"/>
+              <a:t>Owner</a:t>
+            </a:r>
+            <a:r>
+              <a:rPr lang="de-DE" sz="650" dirty="0"/>
+              <a:t>. 2. Auflage. O.O.: RGCG,LLC </a:t>
+            </a:r>
+          </a:p>
+          <a:p>
+            <a:pPr marL="0" indent="0">
+              <a:buNone/>
+            </a:pPr>
+            <a:r>
+              <a:rPr lang="de-DE" sz="650" dirty="0"/>
+              <a:t>	Patton, Jeff (2014): User Story Mapping Beijing, Cambridge, Farnham u.a.: O´ Reilly</a:t>
+            </a:r>
+            <a:br>
+              <a:rPr lang="de-DE" sz="650" dirty="0"/>
+            </a:br>
+            <a:r>
+              <a:rPr lang="de-DE" sz="650" dirty="0"/>
+              <a:t>	</a:t>
+            </a:r>
+            <a:r>
+              <a:rPr lang="de-DE" sz="650" dirty="0" err="1"/>
+              <a:t>Schwaber</a:t>
+            </a:r>
+            <a:r>
+              <a:rPr lang="de-DE" sz="650" dirty="0"/>
+              <a:t>, Ken/Sutherland, Jeff (2020): Der </a:t>
+            </a:r>
+            <a:r>
+              <a:rPr lang="de-DE" sz="650" dirty="0" err="1"/>
+              <a:t>Scrum</a:t>
+            </a:r>
+            <a:r>
+              <a:rPr lang="de-DE" sz="650" dirty="0"/>
+              <a:t> Guide. Der gültige Leitfaden für </a:t>
+            </a:r>
+            <a:r>
+              <a:rPr lang="de-DE" sz="650" dirty="0" err="1"/>
+              <a:t>Scrum</a:t>
+            </a:r>
+            <a:r>
+              <a:rPr lang="de-DE" sz="650" dirty="0"/>
+              <a:t>: Die Spielregeln. http://scrumguides.org/docs/scrumguide/</a:t>
+            </a:r>
+          </a:p>
+          <a:p>
+            <a:pPr marL="0" indent="0">
+              <a:buNone/>
+            </a:pPr>
+            <a:r>
+              <a:rPr lang="de-DE" sz="650" dirty="0"/>
+              <a:t> 	v2020/2020-Scrum-Guide-German.pdf. Abgerufen am 25. Juli 2024</a:t>
             </a:r>
           </a:p>
           <a:p>
@@ -2342,55 +2487,8 @@
               <a:buNone/>
             </a:pPr>
             <a:r>
-              <a:rPr lang="de-DE" sz="800" dirty="0"/>
-              <a:t>Quelle:  </a:t>
-            </a:r>
-            <a:r>
-              <a:rPr lang="de-DE" sz="800" dirty="0" err="1"/>
-              <a:t>Schwaber</a:t>
-            </a:r>
-            <a:r>
-              <a:rPr lang="de-DE" sz="800" dirty="0"/>
-              <a:t>/Sutherland (2020): Der </a:t>
-            </a:r>
-            <a:r>
-              <a:rPr lang="de-DE" sz="800" dirty="0" err="1"/>
-              <a:t>Scrum</a:t>
-            </a:r>
-            <a:r>
-              <a:rPr lang="de-DE" sz="800" dirty="0"/>
-              <a:t> Guide. Der gültige Leitfaden für </a:t>
-            </a:r>
-            <a:r>
-              <a:rPr lang="de-DE" sz="800" dirty="0" err="1"/>
-              <a:t>Scrum</a:t>
-            </a:r>
-            <a:r>
-              <a:rPr lang="de-DE" sz="800" dirty="0"/>
-              <a:t>: Die Spielregeln. http://scrumguides.org/ </a:t>
-            </a:r>
-            <a:br>
-              <a:rPr lang="de-DE" sz="800" dirty="0"/>
-            </a:br>
-            <a:r>
-              <a:rPr lang="de-DE" sz="800" dirty="0"/>
-              <a:t>               </a:t>
-            </a:r>
-            <a:r>
-              <a:rPr lang="de-DE" sz="800" dirty="0" err="1"/>
-              <a:t>docs</a:t>
-            </a:r>
-            <a:r>
-              <a:rPr lang="de-DE" sz="800" dirty="0"/>
-              <a:t>/</a:t>
-            </a:r>
-            <a:r>
-              <a:rPr lang="de-DE" sz="800" dirty="0" err="1"/>
-              <a:t>scrumguide</a:t>
-            </a:r>
-            <a:r>
-              <a:rPr lang="de-DE" sz="800" dirty="0"/>
-              <a:t>/v2020/2020-Scrum-Guide-German.pdf. Abgerufen am 25. Juli 2024</a:t>
+              <a:rPr lang="de-DE" sz="650" dirty="0"/>
+              <a:t>	</a:t>
             </a:r>
           </a:p>
         </p:txBody>

</xml_diff>

<commit_message>
SCR 10,11,12,13 Literatur und Blocksatz
</commit_message>
<xml_diff>
--- a/training-cards/music moves/Scrum (SCR)/ger/apprentice/ger_SCR_10_Hubschrauberperspektive_MM_A.pptx
+++ b/training-cards/music moves/Scrum (SCR)/ger/apprentice/ger_SCR_10_Hubschrauberperspektive_MM_A.pptx
@@ -209,7 +209,7 @@
           <a:p>
             <a:fld id="{65A7DEB4-B5AE-0041-BF85-C0060B36FE09}" type="datetimeFigureOut">
               <a:rPr lang="en-US" smtClean="0"/>
-              <a:t>7/25/24</a:t>
+              <a:t>7/30/24</a:t>
             </a:fld>
             <a:endParaRPr lang="en-US"/>
           </a:p>
@@ -1324,7 +1324,7 @@
           <a:p>
             <a:fld id="{FF5B2BAF-DF38-0A48-A798-0C06E514FD52}" type="datetimeFigureOut">
               <a:rPr lang="de-DE" smtClean="0"/>
-              <a:t>25.07.24</a:t>
+              <a:t>30.07.24</a:t>
             </a:fld>
             <a:endParaRPr lang="de-DE" dirty="0"/>
           </a:p>
@@ -1544,7 +1544,7 @@
           <a:p>
             <a:fld id="{FF5B2BAF-DF38-0A48-A798-0C06E514FD52}" type="datetimeFigureOut">
               <a:rPr lang="de-DE" smtClean="0"/>
-              <a:t>25.07.24</a:t>
+              <a:t>30.07.24</a:t>
             </a:fld>
             <a:endParaRPr lang="de-DE" dirty="0"/>
           </a:p>
@@ -2343,7 +2343,15 @@
             </a:pPr>
             <a:r>
               <a:rPr lang="de-DE" sz="650" dirty="0"/>
-              <a:t>Quellen:	Galen, Robert (2013): SCRUM </a:t>
+              <a:t>Quellen:	</a:t>
+            </a:r>
+            <a:r>
+              <a:rPr lang="de-DE" sz="650" b="1" dirty="0"/>
+              <a:t>Galen</a:t>
+            </a:r>
+            <a:r>
+              <a:rPr lang="de-DE" sz="650" dirty="0"/>
+              <a:t>, Robert (2013): SCRUM </a:t>
             </a:r>
             <a:r>
               <a:rPr lang="de-DE" sz="650" dirty="0" err="1"/>
@@ -2422,7 +2430,7 @@
             </a:br>
             <a:r>
               <a:rPr lang="de-DE" sz="650" dirty="0"/>
-              <a:t>	</a:t>
+              <a:t>	     </a:t>
             </a:r>
             <a:r>
               <a:rPr lang="de-DE" sz="650" dirty="0" err="1"/>
@@ -2439,7 +2447,15 @@
             </a:pPr>
             <a:r>
               <a:rPr lang="de-DE" sz="650" dirty="0"/>
-              <a:t>	Patton, Jeff (2014): User Story Mapping Beijing, Cambridge, Farnham u.a.: O´ Reilly</a:t>
+              <a:t>	</a:t>
+            </a:r>
+            <a:r>
+              <a:rPr lang="de-DE" sz="650" b="1" dirty="0"/>
+              <a:t>Patton</a:t>
+            </a:r>
+            <a:r>
+              <a:rPr lang="de-DE" sz="650" dirty="0"/>
+              <a:t>, Jeff (2014): User Story Mapping Beijing, Cambridge, Farnham u.a.: O´ Reilly</a:t>
             </a:r>
             <a:br>
               <a:rPr lang="de-DE" sz="650" dirty="0"/>
@@ -2449,7 +2465,7 @@
               <a:t>	</a:t>
             </a:r>
             <a:r>
-              <a:rPr lang="de-DE" sz="650" dirty="0" err="1"/>
+              <a:rPr lang="de-DE" sz="650" b="1" dirty="0" err="1"/>
               <a:t>Schwaber</a:t>
             </a:r>
             <a:r>
@@ -2479,7 +2495,7 @@
             </a:pPr>
             <a:r>
               <a:rPr lang="de-DE" sz="650" dirty="0"/>
-              <a:t> 	v2020/2020-Scrum-Guide-German.pdf. Abgerufen am 25. Juli 2024</a:t>
+              <a:t> 	     v2020/2020-Scrum-Guide-German.pdf. Abgerufen am 25. Juli 2024</a:t>
             </a:r>
           </a:p>
           <a:p>

</xml_diff>